<commit_message>
Added WiremockDocker also in the Swarm
</commit_message>
<xml_diff>
--- a/WiremockWireframes.pptx
+++ b/WiremockWireframes.pptx
@@ -3788,7 +3788,14 @@
           <a:p>
             <a:r>
               <a:rPr lang="en-US" dirty="0"/>
-              <a:t>Wiremock UI</a:t>
+              <a:t>Service Virtualization</a:t>
+            </a:r>
+            <a:br>
+              <a:rPr lang="en-US" dirty="0"/>
+            </a:br>
+            <a:r>
+              <a:rPr lang="en-US" dirty="0"/>
+              <a:t>with Wiremock UI</a:t>
             </a:r>
           </a:p>
         </p:txBody>
@@ -6507,7 +6514,7 @@
                   <a:schemeClr val="tx1"/>
                 </a:solidFill>
               </a:rPr>
-              <a:t>Start Server</a:t>
+              <a:t>Start Recording</a:t>
             </a:r>
           </a:p>
         </p:txBody>
@@ -6567,13 +6574,18 @@
           <a:p>
             <a:pPr algn="ctr"/>
             <a:r>
-              <a:rPr lang="en-US" sz="1200" dirty="0">
+              <a:rPr lang="en-US" sz="1200">
                 <a:solidFill>
                   <a:schemeClr val="tx1"/>
                 </a:solidFill>
               </a:rPr>
-              <a:t>Stop Server</a:t>
-            </a:r>
+              <a:t>Stop Recording`</a:t>
+            </a:r>
+            <a:endParaRPr lang="en-US" sz="1200" dirty="0">
+              <a:solidFill>
+                <a:schemeClr val="tx1"/>
+              </a:solidFill>
+            </a:endParaRPr>
           </a:p>
         </p:txBody>
       </p:sp>

</xml_diff>